<commit_message>
SQLite almost done! (still with errors)
</commit_message>
<xml_diff>
--- a/Android Panzenboeck.pptx
+++ b/Android Panzenboeck.pptx
@@ -5,12 +5,14 @@
     <p:sldMasterId id="2147483648" r:id="rId1"/>
   </p:sldMasterIdLst>
   <p:notesMasterIdLst>
-    <p:notesMasterId r:id="rId5"/>
+    <p:notesMasterId r:id="rId7"/>
   </p:notesMasterIdLst>
   <p:sldIdLst>
     <p:sldId id="256" r:id="rId2"/>
-    <p:sldId id="258" r:id="rId3"/>
-    <p:sldId id="257" r:id="rId4"/>
+    <p:sldId id="259" r:id="rId3"/>
+    <p:sldId id="260" r:id="rId4"/>
+    <p:sldId id="258" r:id="rId5"/>
+    <p:sldId id="257" r:id="rId6"/>
   </p:sldIdLst>
   <p:sldSz cx="12192000" cy="6858000"/>
   <p:notesSz cx="6858000" cy="9144000"/>
@@ -109,7 +111,16 @@
       </a:defRPr>
     </a:lvl9pPr>
   </p:defaultTextStyle>
+  <p:extLst>
+    <p:ext uri="{EFAFB233-063F-42B5-8137-9DF3F51BA10A}">
+      <p15:sldGuideLst xmlns:p15="http://schemas.microsoft.com/office/powerpoint/2012/main"/>
+    </p:ext>
+  </p:extLst>
 </p:presentation>
+</file>
+
+<file path=ppt/revisionInfo.xml><?xml version="1.0" encoding="utf-8"?>
+<p1510:revInfo xmlns:a="http://schemas.openxmlformats.org/drawingml/2006/main" xmlns:r="http://schemas.openxmlformats.org/officeDocument/2006/relationships" xmlns:p1510="http://schemas.microsoft.com/office/powerpoint/2015/10/main"/>
 </file>
 
 <file path=ppt/notesMasters/notesMaster1.xml><?xml version="1.0" encoding="utf-8"?>
@@ -506,33 +517,22 @@
           <a:bodyPr/>
           <a:lstStyle/>
           <a:p>
-            <a:pPr marL="0" marR="0" lvl="0" indent="0" algn="l" defTabSz="914400" rtl="0" eaLnBrk="1" fontAlgn="auto" latinLnBrk="0" hangingPunct="1">
-              <a:lnSpc>
-                <a:spcPct val="100000"/>
-              </a:lnSpc>
-              <a:spcBef>
-                <a:spcPts val="0"/>
-              </a:spcBef>
-              <a:spcAft>
-                <a:spcPts val="0"/>
-              </a:spcAft>
-              <a:buClrTx/>
-              <a:buSzTx/>
-              <a:buFontTx/>
-              <a:buNone/>
-              <a:tabLst/>
-              <a:defRPr/>
-            </a:pPr>
             <a:r>
               <a:rPr lang="de-AT" dirty="0"/>
-              <a:t>Multi User: </a:t>
-            </a:r>
-            <a:r>
-              <a:rPr lang="de-AT" b="0" dirty="0"/>
-              <a:t>Ermöglicht es, mehrere Benutzer auf einem Android Gerät zu haben. Inkludiert auch einen „Guest“ Modus für temporären eingeschränkten Zugriff</a:t>
-            </a:r>
-          </a:p>
-          <a:p>
+              <a:t>Der wesentliche Unterschied zu anderen Datenbanksystemen: Integration der DB in Applikationen. -&gt; </a:t>
+            </a:r>
+            <a:r>
+              <a:rPr lang="de-AT" dirty="0" err="1"/>
+              <a:t>lightweight</a:t>
+            </a:r>
+            <a:r>
+              <a:rPr lang="de-AT" dirty="0"/>
+              <a:t>, </a:t>
+            </a:r>
+            <a:r>
+              <a:rPr lang="de-AT" dirty="0" err="1"/>
+              <a:t>independent</a:t>
+            </a:r>
             <a:endParaRPr lang="de-AT" dirty="0"/>
           </a:p>
         </p:txBody>
@@ -563,7 +563,7 @@
     </p:spTree>
     <p:extLst>
       <p:ext uri="{BB962C8B-B14F-4D97-AF65-F5344CB8AC3E}">
-        <p14:creationId xmlns:p14="http://schemas.microsoft.com/office/powerpoint/2010/main" val="2200478098"/>
+        <p14:creationId xmlns:p14="http://schemas.microsoft.com/office/powerpoint/2010/main" val="2434801064"/>
       </p:ext>
     </p:extLst>
   </p:cSld>
@@ -617,6 +617,117 @@
           <a:bodyPr/>
           <a:lstStyle/>
           <a:p>
+            <a:pPr marL="0" marR="0" lvl="0" indent="0" algn="l" defTabSz="914400" rtl="0" eaLnBrk="1" fontAlgn="auto" latinLnBrk="0" hangingPunct="1">
+              <a:lnSpc>
+                <a:spcPct val="100000"/>
+              </a:lnSpc>
+              <a:spcBef>
+                <a:spcPts val="0"/>
+              </a:spcBef>
+              <a:spcAft>
+                <a:spcPts val="0"/>
+              </a:spcAft>
+              <a:buClrTx/>
+              <a:buSzTx/>
+              <a:buFontTx/>
+              <a:buNone/>
+              <a:tabLst/>
+              <a:defRPr/>
+            </a:pPr>
+            <a:r>
+              <a:rPr lang="de-AT" dirty="0"/>
+              <a:t>Multi User: </a:t>
+            </a:r>
+            <a:r>
+              <a:rPr lang="de-AT" b="0" dirty="0"/>
+              <a:t>Ermöglicht es, mehrere Benutzer auf einem Android Gerät zu haben. Inkludiert auch einen „Guest“ Modus für temporären eingeschränkten Zugriff</a:t>
+            </a:r>
+          </a:p>
+          <a:p>
+            <a:endParaRPr lang="de-AT" dirty="0"/>
+          </a:p>
+        </p:txBody>
+      </p:sp>
+      <p:sp>
+        <p:nvSpPr>
+          <p:cNvPr id="4" name="Foliennummernplatzhalter 3"/>
+          <p:cNvSpPr>
+            <a:spLocks noGrp="1"/>
+          </p:cNvSpPr>
+          <p:nvPr>
+            <p:ph type="sldNum" sz="quarter" idx="10"/>
+          </p:nvPr>
+        </p:nvSpPr>
+        <p:spPr/>
+        <p:txBody>
+          <a:bodyPr/>
+          <a:lstStyle/>
+          <a:p>
+            <a:fld id="{36C7B305-3DCD-4901-862E-AFF508EB2F83}" type="slidenum">
+              <a:rPr lang="de-AT" smtClean="0"/>
+              <a:t>4</a:t>
+            </a:fld>
+            <a:endParaRPr lang="de-AT"/>
+          </a:p>
+        </p:txBody>
+      </p:sp>
+    </p:spTree>
+    <p:extLst>
+      <p:ext uri="{BB962C8B-B14F-4D97-AF65-F5344CB8AC3E}">
+        <p14:creationId xmlns:p14="http://schemas.microsoft.com/office/powerpoint/2010/main" val="2200478098"/>
+      </p:ext>
+    </p:extLst>
+  </p:cSld>
+  <p:clrMapOvr>
+    <a:masterClrMapping/>
+  </p:clrMapOvr>
+</p:notes>
+</file>
+
+<file path=ppt/notesSlides/notesSlide3.xml><?xml version="1.0" encoding="utf-8"?>
+<p:notes xmlns:a="http://schemas.openxmlformats.org/drawingml/2006/main" xmlns:r="http://schemas.openxmlformats.org/officeDocument/2006/relationships" xmlns:p="http://schemas.openxmlformats.org/presentationml/2006/main">
+  <p:cSld>
+    <p:spTree>
+      <p:nvGrpSpPr>
+        <p:cNvPr id="1" name=""/>
+        <p:cNvGrpSpPr/>
+        <p:nvPr/>
+      </p:nvGrpSpPr>
+      <p:grpSpPr>
+        <a:xfrm>
+          <a:off x="0" y="0"/>
+          <a:ext cx="0" cy="0"/>
+          <a:chOff x="0" y="0"/>
+          <a:chExt cx="0" cy="0"/>
+        </a:xfrm>
+      </p:grpSpPr>
+      <p:sp>
+        <p:nvSpPr>
+          <p:cNvPr id="2" name="Folienbildplatzhalter 1"/>
+          <p:cNvSpPr>
+            <a:spLocks noGrp="1" noRot="1" noChangeAspect="1"/>
+          </p:cNvSpPr>
+          <p:nvPr>
+            <p:ph type="sldImg"/>
+          </p:nvPr>
+        </p:nvSpPr>
+        <p:spPr/>
+      </p:sp>
+      <p:sp>
+        <p:nvSpPr>
+          <p:cNvPr id="3" name="Notizenplatzhalter 2"/>
+          <p:cNvSpPr>
+            <a:spLocks noGrp="1"/>
+          </p:cNvSpPr>
+          <p:nvPr>
+            <p:ph type="body" idx="1"/>
+          </p:nvPr>
+        </p:nvSpPr>
+        <p:spPr/>
+        <p:txBody>
+          <a:bodyPr/>
+          <a:lstStyle/>
+          <a:p>
             <a:r>
               <a:rPr lang="de-AT" dirty="0" err="1"/>
               <a:t>Verified</a:t>
@@ -702,7 +813,7 @@
           <a:p>
             <a:fld id="{36C7B305-3DCD-4901-862E-AFF508EB2F83}" type="slidenum">
               <a:rPr lang="de-AT" smtClean="0"/>
-              <a:t>3</a:t>
+              <a:t>5</a:t>
             </a:fld>
             <a:endParaRPr lang="de-AT"/>
           </a:p>
@@ -3979,7 +4090,7 @@
           <a:p>
             <a:r>
               <a:rPr lang="de-AT" dirty="0"/>
-              <a:t>Android</a:t>
+              <a:t>Security Milestones in Android</a:t>
             </a:r>
           </a:p>
         </p:txBody>
@@ -4005,7 +4116,11 @@
           <a:bodyPr/>
           <a:lstStyle/>
           <a:p>
-            <a:endParaRPr lang="de-AT"/>
+            <a:r>
+              <a:rPr lang="de-AT" dirty="0" err="1"/>
+              <a:t>Lukas.riedliscool</a:t>
+            </a:r>
+            <a:endParaRPr lang="de-AT" dirty="0"/>
           </a:p>
         </p:txBody>
       </p:sp>
@@ -4044,6 +4159,187 @@
           <p:cNvPr id="2" name="Titel 1">
             <a:extLst>
               <a:ext uri="{FF2B5EF4-FFF2-40B4-BE49-F238E27FC236}">
+                <a16:creationId xmlns:a16="http://schemas.microsoft.com/office/drawing/2014/main" id="{A9B18959-AA6B-45FF-B616-8E71A9C6F04B}"/>
+              </a:ext>
+            </a:extLst>
+          </p:cNvPr>
+          <p:cNvSpPr>
+            <a:spLocks noGrp="1"/>
+          </p:cNvSpPr>
+          <p:nvPr>
+            <p:ph type="title"/>
+          </p:nvPr>
+        </p:nvSpPr>
+        <p:spPr/>
+        <p:txBody>
+          <a:bodyPr/>
+          <a:lstStyle/>
+          <a:p>
+            <a:r>
+              <a:rPr lang="de-AT" dirty="0"/>
+              <a:t>SQLITE Database</a:t>
+            </a:r>
+          </a:p>
+        </p:txBody>
+      </p:sp>
+      <p:sp>
+        <p:nvSpPr>
+          <p:cNvPr id="3" name="Inhaltsplatzhalter 2">
+            <a:extLst>
+              <a:ext uri="{FF2B5EF4-FFF2-40B4-BE49-F238E27FC236}">
+                <a16:creationId xmlns:a16="http://schemas.microsoft.com/office/drawing/2014/main" id="{42F3FCE6-2E87-4FDD-84AE-A464650AFCC6}"/>
+              </a:ext>
+            </a:extLst>
+          </p:cNvPr>
+          <p:cNvSpPr>
+            <a:spLocks noGrp="1"/>
+          </p:cNvSpPr>
+          <p:nvPr>
+            <p:ph idx="1"/>
+          </p:nvPr>
+        </p:nvSpPr>
+        <p:spPr/>
+        <p:txBody>
+          <a:bodyPr/>
+          <a:lstStyle/>
+          <a:p>
+            <a:r>
+              <a:rPr lang="de-AT" dirty="0"/>
+              <a:t>Lightweight</a:t>
+            </a:r>
+          </a:p>
+          <a:p>
+            <a:r>
+              <a:rPr lang="de-AT" dirty="0"/>
+              <a:t>Gut geeignet für ‚kleine‘ Anwendungen</a:t>
+            </a:r>
+          </a:p>
+          <a:p>
+            <a:r>
+              <a:rPr lang="de-AT" dirty="0"/>
+              <a:t>Basic Funktionen (CRUD)</a:t>
+            </a:r>
+          </a:p>
+        </p:txBody>
+      </p:sp>
+    </p:spTree>
+    <p:extLst>
+      <p:ext uri="{BB962C8B-B14F-4D97-AF65-F5344CB8AC3E}">
+        <p14:creationId xmlns:p14="http://schemas.microsoft.com/office/powerpoint/2010/main" val="2353365557"/>
+      </p:ext>
+    </p:extLst>
+  </p:cSld>
+  <p:clrMapOvr>
+    <a:masterClrMapping/>
+  </p:clrMapOvr>
+</p:sld>
+</file>
+
+<file path=ppt/slides/slide3.xml><?xml version="1.0" encoding="utf-8"?>
+<p:sld xmlns:a="http://schemas.openxmlformats.org/drawingml/2006/main" xmlns:r="http://schemas.openxmlformats.org/officeDocument/2006/relationships" xmlns:p="http://schemas.openxmlformats.org/presentationml/2006/main">
+  <p:cSld>
+    <p:spTree>
+      <p:nvGrpSpPr>
+        <p:cNvPr id="1" name=""/>
+        <p:cNvGrpSpPr/>
+        <p:nvPr/>
+      </p:nvGrpSpPr>
+      <p:grpSpPr>
+        <a:xfrm>
+          <a:off x="0" y="0"/>
+          <a:ext cx="0" cy="0"/>
+          <a:chOff x="0" y="0"/>
+          <a:chExt cx="0" cy="0"/>
+        </a:xfrm>
+      </p:grpSpPr>
+      <p:sp>
+        <p:nvSpPr>
+          <p:cNvPr id="2" name="Titel 1">
+            <a:extLst>
+              <a:ext uri="{FF2B5EF4-FFF2-40B4-BE49-F238E27FC236}">
+                <a16:creationId xmlns:a16="http://schemas.microsoft.com/office/drawing/2014/main" id="{14A585AE-BCF0-48FA-B0FE-717F248995FE}"/>
+              </a:ext>
+            </a:extLst>
+          </p:cNvPr>
+          <p:cNvSpPr>
+            <a:spLocks noGrp="1"/>
+          </p:cNvSpPr>
+          <p:nvPr>
+            <p:ph type="title"/>
+          </p:nvPr>
+        </p:nvSpPr>
+        <p:spPr/>
+        <p:txBody>
+          <a:bodyPr/>
+          <a:lstStyle/>
+          <a:p>
+            <a:r>
+              <a:rPr lang="de-AT" dirty="0"/>
+              <a:t>SQLITE in Android</a:t>
+            </a:r>
+          </a:p>
+        </p:txBody>
+      </p:sp>
+      <p:sp>
+        <p:nvSpPr>
+          <p:cNvPr id="3" name="Inhaltsplatzhalter 2">
+            <a:extLst>
+              <a:ext uri="{FF2B5EF4-FFF2-40B4-BE49-F238E27FC236}">
+                <a16:creationId xmlns:a16="http://schemas.microsoft.com/office/drawing/2014/main" id="{5416381E-7214-47CE-9459-DDC2C267814E}"/>
+              </a:ext>
+            </a:extLst>
+          </p:cNvPr>
+          <p:cNvSpPr>
+            <a:spLocks noGrp="1"/>
+          </p:cNvSpPr>
+          <p:nvPr>
+            <p:ph idx="1"/>
+          </p:nvPr>
+        </p:nvSpPr>
+        <p:spPr/>
+        <p:txBody>
+          <a:bodyPr/>
+          <a:lstStyle/>
+          <a:p>
+            <a:endParaRPr lang="de-AT" dirty="0"/>
+          </a:p>
+        </p:txBody>
+      </p:sp>
+    </p:spTree>
+    <p:extLst>
+      <p:ext uri="{BB962C8B-B14F-4D97-AF65-F5344CB8AC3E}">
+        <p14:creationId xmlns:p14="http://schemas.microsoft.com/office/powerpoint/2010/main" val="3944832945"/>
+      </p:ext>
+    </p:extLst>
+  </p:cSld>
+  <p:clrMapOvr>
+    <a:masterClrMapping/>
+  </p:clrMapOvr>
+</p:sld>
+</file>
+
+<file path=ppt/slides/slide4.xml><?xml version="1.0" encoding="utf-8"?>
+<p:sld xmlns:a="http://schemas.openxmlformats.org/drawingml/2006/main" xmlns:r="http://schemas.openxmlformats.org/officeDocument/2006/relationships" xmlns:p="http://schemas.openxmlformats.org/presentationml/2006/main">
+  <p:cSld>
+    <p:spTree>
+      <p:nvGrpSpPr>
+        <p:cNvPr id="1" name=""/>
+        <p:cNvGrpSpPr/>
+        <p:nvPr/>
+      </p:nvGrpSpPr>
+      <p:grpSpPr>
+        <a:xfrm>
+          <a:off x="0" y="0"/>
+          <a:ext cx="0" cy="0"/>
+          <a:chOff x="0" y="0"/>
+          <a:chExt cx="0" cy="0"/>
+        </a:xfrm>
+      </p:grpSpPr>
+      <p:sp>
+        <p:nvSpPr>
+          <p:cNvPr id="2" name="Titel 1">
+            <a:extLst>
+              <a:ext uri="{FF2B5EF4-FFF2-40B4-BE49-F238E27FC236}">
                 <a16:creationId xmlns:a16="http://schemas.microsoft.com/office/drawing/2014/main" id="{A3527037-3C8E-41AC-8179-12B07C3231D7}"/>
               </a:ext>
             </a:extLst>
@@ -4082,14 +4378,14 @@
           <p:nvPr>
             <p:extLst>
               <p:ext uri="{D42A27DB-BD31-4B8C-83A1-F6EECF244321}">
-                <p14:modId xmlns:p14="http://schemas.microsoft.com/office/powerpoint/2010/main" val="2767942998"/>
+                <p14:modId xmlns:p14="http://schemas.microsoft.com/office/powerpoint/2010/main" val="398997719"/>
               </p:ext>
             </p:extLst>
           </p:nvPr>
         </p:nvGraphicFramePr>
         <p:xfrm>
-          <a:off x="2032000" y="1567595"/>
-          <a:ext cx="8184662" cy="4371530"/>
+          <a:off x="975360" y="1400370"/>
+          <a:ext cx="10241280" cy="5092505"/>
         </p:xfrm>
         <a:graphic>
           <a:graphicData uri="http://schemas.openxmlformats.org/drawingml/2006/table">
@@ -4098,14 +4394,14 @@
                 <a:tableStyleId>{5C22544A-7EE6-4342-B048-85BDC9FD1C3A}</a:tableStyleId>
               </a:tblPr>
               <a:tblGrid>
-                <a:gridCol w="4092331">
+                <a:gridCol w="5120640">
                   <a:extLst>
                     <a:ext uri="{9D8B030D-6E8A-4147-A177-3AD203B41FA5}">
                       <a16:colId xmlns:a16="http://schemas.microsoft.com/office/drawing/2014/main" val="671584466"/>
                     </a:ext>
                   </a:extLst>
                 </a:gridCol>
-                <a:gridCol w="4092331">
+                <a:gridCol w="5120640">
                   <a:extLst>
                     <a:ext uri="{9D8B030D-6E8A-4147-A177-3AD203B41FA5}">
                       <a16:colId xmlns:a16="http://schemas.microsoft.com/office/drawing/2014/main" val="1858703610"/>
@@ -4113,7 +4409,7 @@
                   </a:extLst>
                 </a:gridCol>
               </a:tblGrid>
-              <a:tr h="326993">
+              <a:tr h="426797">
                 <a:tc>
                   <a:txBody>
                     <a:bodyPr/>
@@ -4140,7 +4436,7 @@
                   </a:ext>
                 </a:extLst>
               </a:tr>
-              <a:tr h="806285">
+              <a:tr h="939118">
                 <a:tc>
                   <a:txBody>
                     <a:bodyPr/>
@@ -4173,7 +4469,7 @@
                   </a:ext>
                 </a:extLst>
               </a:tr>
-              <a:tr h="564400">
+              <a:tr h="1065045">
                 <a:tc>
                   <a:txBody>
                     <a:bodyPr/>
@@ -4227,7 +4523,7 @@
                   </a:ext>
                 </a:extLst>
               </a:tr>
-              <a:tr h="645398">
+              <a:tr h="1065045">
                 <a:tc>
                   <a:txBody>
                     <a:bodyPr/>
@@ -4296,7 +4592,7 @@
                   </a:ext>
                 </a:extLst>
               </a:tr>
-              <a:tr h="806285">
+              <a:tr h="939118">
                 <a:tc>
                   <a:txBody>
                     <a:bodyPr/>
@@ -4335,7 +4631,7 @@
                   </a:ext>
                 </a:extLst>
               </a:tr>
-              <a:tr h="564400">
+              <a:tr h="657382">
                 <a:tc>
                   <a:txBody>
                     <a:bodyPr/>
@@ -4385,7 +4681,7 @@
 </p:sld>
 </file>
 
-<file path=ppt/slides/slide3.xml><?xml version="1.0" encoding="utf-8"?>
+<file path=ppt/slides/slide5.xml><?xml version="1.0" encoding="utf-8"?>
 <p:sld xmlns:a="http://schemas.openxmlformats.org/drawingml/2006/main" xmlns:r="http://schemas.openxmlformats.org/officeDocument/2006/relationships" xmlns:p="http://schemas.openxmlformats.org/presentationml/2006/main">
   <p:cSld>
     <p:spTree>

</xml_diff>

<commit_message>
DataAccess gscheid gmocht, FragmentAgain wesentlich schena
</commit_message>
<xml_diff>
--- a/Android Panzenboeck.pptx
+++ b/Android Panzenboeck.pptx
@@ -6071,19 +6071,17 @@
       </p:sp>
       <p:pic>
         <p:nvPicPr>
-          <p:cNvPr id="4" name="Inhaltsplatzhalter 3">
-            <a:extLst>
-              <a:ext uri="{FF2B5EF4-FFF2-40B4-BE49-F238E27FC236}">
-                <a16:creationId xmlns:a16="http://schemas.microsoft.com/office/drawing/2014/main" id="{04017529-CD47-491E-A91B-F807F20F684F}"/>
+          <p:cNvPr id="8" name="Grafik 7">
+            <a:extLst>
+              <a:ext uri="{FF2B5EF4-FFF2-40B4-BE49-F238E27FC236}">
+                <a16:creationId xmlns:a16="http://schemas.microsoft.com/office/drawing/2014/main" id="{409F4361-C97F-4E4D-895A-8A34369F8E67}"/>
               </a:ext>
             </a:extLst>
           </p:cNvPr>
           <p:cNvPicPr>
-            <a:picLocks noGrp="1" noChangeAspect="1"/>
+            <a:picLocks noChangeAspect="1"/>
           </p:cNvPicPr>
-          <p:nvPr>
-            <p:ph idx="1"/>
-          </p:nvPr>
+          <p:nvPr/>
         </p:nvPicPr>
         <p:blipFill>
           <a:blip r:embed="rId3"/>
@@ -6093,8 +6091,8 @@
         </p:blipFill>
         <p:spPr>
           <a:xfrm>
-            <a:off x="1745325" y="1518792"/>
-            <a:ext cx="8701349" cy="3820416"/>
+            <a:off x="1490791" y="1912776"/>
+            <a:ext cx="9210417" cy="3958983"/>
           </a:xfrm>
           <a:prstGeom prst="rect">
             <a:avLst/>
@@ -6169,36 +6167,28 @@
       </p:sp>
       <p:pic>
         <p:nvPicPr>
-          <p:cNvPr id="4" name="Inhaltsplatzhalter 3" descr="Ein Bild, das Screenshot enthält.&#10;&#10;Mit sehr hoher Zuverlässigkeit generierte Beschreibung">
-            <a:extLst>
-              <a:ext uri="{FF2B5EF4-FFF2-40B4-BE49-F238E27FC236}">
-                <a16:creationId xmlns:a16="http://schemas.microsoft.com/office/drawing/2014/main" id="{12C30884-5993-4DB7-A5EF-D2E4055E734D}"/>
+          <p:cNvPr id="6" name="Grafik 5">
+            <a:extLst>
+              <a:ext uri="{FF2B5EF4-FFF2-40B4-BE49-F238E27FC236}">
+                <a16:creationId xmlns:a16="http://schemas.microsoft.com/office/drawing/2014/main" id="{A31AF44D-7AA2-4E61-B5DF-9AED312C519C}"/>
               </a:ext>
             </a:extLst>
           </p:cNvPr>
           <p:cNvPicPr>
-            <a:picLocks noGrp="1" noChangeAspect="1"/>
+            <a:picLocks noChangeAspect="1"/>
           </p:cNvPicPr>
-          <p:nvPr>
-            <p:ph idx="1"/>
-          </p:nvPr>
+          <p:nvPr/>
         </p:nvPicPr>
         <p:blipFill>
-          <a:blip r:embed="rId3">
-            <a:extLst>
-              <a:ext uri="{28A0092B-C50C-407E-A947-70E740481C1C}">
-                <a14:useLocalDpi xmlns:a14="http://schemas.microsoft.com/office/drawing/2010/main" val="0"/>
-              </a:ext>
-            </a:extLst>
-          </a:blip>
+          <a:blip r:embed="rId3"/>
           <a:stretch>
             <a:fillRect/>
           </a:stretch>
         </p:blipFill>
         <p:spPr>
           <a:xfrm>
-            <a:off x="1755914" y="1570459"/>
-            <a:ext cx="8680172" cy="3717082"/>
+            <a:off x="382999" y="2183364"/>
+            <a:ext cx="11426001" cy="2673706"/>
           </a:xfrm>
           <a:prstGeom prst="rect">
             <a:avLst/>

</xml_diff>